<commit_message>
Updated PPT transition animations
</commit_message>
<xml_diff>
--- a/어메이징 첵스.pptx
+++ b/어메이징 첵스.pptx
@@ -1349,6 +1349,14 @@
         </dgm:presLayoutVars>
       </dgm:prSet>
       <dgm:spPr/>
+      <dgm:t>
+        <a:bodyPr/>
+        <a:lstStyle/>
+        <a:p>
+          <a:pPr latinLnBrk="1"/>
+          <a:endParaRPr lang="ko-KR" altLang="en-US"/>
+        </a:p>
+      </dgm:t>
     </dgm:pt>
     <dgm:pt modelId="{14451B00-6941-42B5-9F9D-1B51D8DAD3E4}" type="pres">
       <dgm:prSet presAssocID="{09EFDA44-C03D-482C-8D9A-3BCAD5E9FAA2}" presName="hierRoot1" presStyleCnt="0">
@@ -1380,6 +1388,14 @@
     <dgm:pt modelId="{256897F6-CEE9-47C4-BD03-0B3C1D19DD93}" type="pres">
       <dgm:prSet presAssocID="{09EFDA44-C03D-482C-8D9A-3BCAD5E9FAA2}" presName="rootConnector1" presStyleLbl="node1" presStyleIdx="0" presStyleCnt="0"/>
       <dgm:spPr/>
+      <dgm:t>
+        <a:bodyPr/>
+        <a:lstStyle/>
+        <a:p>
+          <a:pPr latinLnBrk="1"/>
+          <a:endParaRPr lang="ko-KR" altLang="en-US"/>
+        </a:p>
+      </dgm:t>
     </dgm:pt>
     <dgm:pt modelId="{10014FBD-7E75-4CB4-B6A7-077331DBFF92}" type="pres">
       <dgm:prSet presAssocID="{09EFDA44-C03D-482C-8D9A-3BCAD5E9FAA2}" presName="hierChild2" presStyleCnt="0"/>
@@ -1388,6 +1404,14 @@
     <dgm:pt modelId="{215B204D-C63C-4457-8C57-7DD22C6C8CBF}" type="pres">
       <dgm:prSet presAssocID="{93A17517-A907-433E-8AD7-1B2843E9081A}" presName="Name37" presStyleLbl="parChTrans1D2" presStyleIdx="0" presStyleCnt="6"/>
       <dgm:spPr/>
+      <dgm:t>
+        <a:bodyPr/>
+        <a:lstStyle/>
+        <a:p>
+          <a:pPr latinLnBrk="1"/>
+          <a:endParaRPr lang="ko-KR" altLang="en-US"/>
+        </a:p>
+      </dgm:t>
     </dgm:pt>
     <dgm:pt modelId="{C6C69650-0D70-41CF-8C03-DE21EA4048C1}" type="pres">
       <dgm:prSet presAssocID="{0A22099F-AA05-4C1E-8EA6-BE32E3DC285F}" presName="hierRoot2" presStyleCnt="0">
@@ -1408,10 +1432,26 @@
         </dgm:presLayoutVars>
       </dgm:prSet>
       <dgm:spPr/>
+      <dgm:t>
+        <a:bodyPr/>
+        <a:lstStyle/>
+        <a:p>
+          <a:pPr latinLnBrk="1"/>
+          <a:endParaRPr lang="ko-KR" altLang="en-US"/>
+        </a:p>
+      </dgm:t>
     </dgm:pt>
     <dgm:pt modelId="{21DE92BB-7016-47C7-933C-51AA22B4A412}" type="pres">
       <dgm:prSet presAssocID="{0A22099F-AA05-4C1E-8EA6-BE32E3DC285F}" presName="rootConnector" presStyleLbl="node2" presStyleIdx="0" presStyleCnt="6"/>
       <dgm:spPr/>
+      <dgm:t>
+        <a:bodyPr/>
+        <a:lstStyle/>
+        <a:p>
+          <a:pPr latinLnBrk="1"/>
+          <a:endParaRPr lang="ko-KR" altLang="en-US"/>
+        </a:p>
+      </dgm:t>
     </dgm:pt>
     <dgm:pt modelId="{9188C6F5-131C-45E3-9420-6A0892C25A64}" type="pres">
       <dgm:prSet presAssocID="{0A22099F-AA05-4C1E-8EA6-BE32E3DC285F}" presName="hierChild4" presStyleCnt="0"/>
@@ -1424,6 +1464,14 @@
     <dgm:pt modelId="{E4A93F4F-B23D-4A57-A426-43C5358C36C3}" type="pres">
       <dgm:prSet presAssocID="{4F3E24BA-FE54-475C-AD50-53D309A6C16A}" presName="Name37" presStyleLbl="parChTrans1D2" presStyleIdx="1" presStyleCnt="6"/>
       <dgm:spPr/>
+      <dgm:t>
+        <a:bodyPr/>
+        <a:lstStyle/>
+        <a:p>
+          <a:pPr latinLnBrk="1"/>
+          <a:endParaRPr lang="ko-KR" altLang="en-US"/>
+        </a:p>
+      </dgm:t>
     </dgm:pt>
     <dgm:pt modelId="{D9044937-286F-441E-A9B3-82D0C3D4B0A7}" type="pres">
       <dgm:prSet presAssocID="{944D2394-F00D-48E8-A7A2-80295C18C6B0}" presName="hierRoot2" presStyleCnt="0">
@@ -1444,10 +1492,26 @@
         </dgm:presLayoutVars>
       </dgm:prSet>
       <dgm:spPr/>
+      <dgm:t>
+        <a:bodyPr/>
+        <a:lstStyle/>
+        <a:p>
+          <a:pPr latinLnBrk="1"/>
+          <a:endParaRPr lang="ko-KR" altLang="en-US"/>
+        </a:p>
+      </dgm:t>
     </dgm:pt>
     <dgm:pt modelId="{7BD44A68-6CA4-45D0-AC86-663A575200BF}" type="pres">
       <dgm:prSet presAssocID="{944D2394-F00D-48E8-A7A2-80295C18C6B0}" presName="rootConnector" presStyleLbl="node2" presStyleIdx="1" presStyleCnt="6"/>
       <dgm:spPr/>
+      <dgm:t>
+        <a:bodyPr/>
+        <a:lstStyle/>
+        <a:p>
+          <a:pPr latinLnBrk="1"/>
+          <a:endParaRPr lang="ko-KR" altLang="en-US"/>
+        </a:p>
+      </dgm:t>
     </dgm:pt>
     <dgm:pt modelId="{AD37853B-C233-4CC0-9B7B-5F0E81EC422D}" type="pres">
       <dgm:prSet presAssocID="{944D2394-F00D-48E8-A7A2-80295C18C6B0}" presName="hierChild4" presStyleCnt="0"/>
@@ -1460,6 +1524,14 @@
     <dgm:pt modelId="{18AAB7A8-4998-4003-A91C-993F6C63A9B3}" type="pres">
       <dgm:prSet presAssocID="{7E9CDB11-5058-4486-AFDB-0684D922A654}" presName="Name37" presStyleLbl="parChTrans1D2" presStyleIdx="2" presStyleCnt="6"/>
       <dgm:spPr/>
+      <dgm:t>
+        <a:bodyPr/>
+        <a:lstStyle/>
+        <a:p>
+          <a:pPr latinLnBrk="1"/>
+          <a:endParaRPr lang="ko-KR" altLang="en-US"/>
+        </a:p>
+      </dgm:t>
     </dgm:pt>
     <dgm:pt modelId="{3255F9E5-4F4C-4433-A1F0-C672C4D9A3AA}" type="pres">
       <dgm:prSet presAssocID="{6CED97D0-A1AF-4C0D-8180-C507D7931F13}" presName="hierRoot2" presStyleCnt="0">
@@ -1480,10 +1552,26 @@
         </dgm:presLayoutVars>
       </dgm:prSet>
       <dgm:spPr/>
+      <dgm:t>
+        <a:bodyPr/>
+        <a:lstStyle/>
+        <a:p>
+          <a:pPr latinLnBrk="1"/>
+          <a:endParaRPr lang="ko-KR" altLang="en-US"/>
+        </a:p>
+      </dgm:t>
     </dgm:pt>
     <dgm:pt modelId="{87A6D035-F5DC-409B-A416-D7BAFEFC40D7}" type="pres">
       <dgm:prSet presAssocID="{6CED97D0-A1AF-4C0D-8180-C507D7931F13}" presName="rootConnector" presStyleLbl="node2" presStyleIdx="2" presStyleCnt="6"/>
       <dgm:spPr/>
+      <dgm:t>
+        <a:bodyPr/>
+        <a:lstStyle/>
+        <a:p>
+          <a:pPr latinLnBrk="1"/>
+          <a:endParaRPr lang="ko-KR" altLang="en-US"/>
+        </a:p>
+      </dgm:t>
     </dgm:pt>
     <dgm:pt modelId="{CA8AD71F-BC09-4CC1-99D7-B486A3C15641}" type="pres">
       <dgm:prSet presAssocID="{6CED97D0-A1AF-4C0D-8180-C507D7931F13}" presName="hierChild4" presStyleCnt="0"/>
@@ -1496,6 +1584,14 @@
     <dgm:pt modelId="{6934252C-5748-4093-90C7-F061D0DAAD1F}" type="pres">
       <dgm:prSet presAssocID="{00C13C7A-3552-4F8E-8BE8-50ADD0DE0ACA}" presName="Name37" presStyleLbl="parChTrans1D2" presStyleIdx="3" presStyleCnt="6"/>
       <dgm:spPr/>
+      <dgm:t>
+        <a:bodyPr/>
+        <a:lstStyle/>
+        <a:p>
+          <a:pPr latinLnBrk="1"/>
+          <a:endParaRPr lang="ko-KR" altLang="en-US"/>
+        </a:p>
+      </dgm:t>
     </dgm:pt>
     <dgm:pt modelId="{E62A2D0F-D2E8-4E2D-952A-A658047A6EBF}" type="pres">
       <dgm:prSet presAssocID="{F1C4BB12-6960-4CFC-B4D3-5963B33FB456}" presName="hierRoot2" presStyleCnt="0">
@@ -1527,6 +1623,14 @@
     <dgm:pt modelId="{9083C3B2-92D1-41D2-9856-5CEF321DD751}" type="pres">
       <dgm:prSet presAssocID="{F1C4BB12-6960-4CFC-B4D3-5963B33FB456}" presName="rootConnector" presStyleLbl="node2" presStyleIdx="3" presStyleCnt="6"/>
       <dgm:spPr/>
+      <dgm:t>
+        <a:bodyPr/>
+        <a:lstStyle/>
+        <a:p>
+          <a:pPr latinLnBrk="1"/>
+          <a:endParaRPr lang="ko-KR" altLang="en-US"/>
+        </a:p>
+      </dgm:t>
     </dgm:pt>
     <dgm:pt modelId="{317D1327-B85A-4149-8116-3BB5FE1FB22D}" type="pres">
       <dgm:prSet presAssocID="{F1C4BB12-6960-4CFC-B4D3-5963B33FB456}" presName="hierChild4" presStyleCnt="0"/>
@@ -1539,6 +1643,14 @@
     <dgm:pt modelId="{7FBD0CAC-341E-4E9A-A89F-0A9CB46BF04D}" type="pres">
       <dgm:prSet presAssocID="{33B2CCA2-A001-41CC-B63C-14365D57532F}" presName="Name37" presStyleLbl="parChTrans1D2" presStyleIdx="4" presStyleCnt="6"/>
       <dgm:spPr/>
+      <dgm:t>
+        <a:bodyPr/>
+        <a:lstStyle/>
+        <a:p>
+          <a:pPr latinLnBrk="1"/>
+          <a:endParaRPr lang="ko-KR" altLang="en-US"/>
+        </a:p>
+      </dgm:t>
     </dgm:pt>
     <dgm:pt modelId="{BB3CE19A-3FB4-47FE-BB34-462E018E984F}" type="pres">
       <dgm:prSet presAssocID="{97978136-BC51-4981-90BF-11C4F21D8B06}" presName="hierRoot2" presStyleCnt="0">
@@ -1570,6 +1682,14 @@
     <dgm:pt modelId="{5C76DCFF-A5AB-470A-BAB4-ABEA8B5F5F8E}" type="pres">
       <dgm:prSet presAssocID="{97978136-BC51-4981-90BF-11C4F21D8B06}" presName="rootConnector" presStyleLbl="node2" presStyleIdx="4" presStyleCnt="6"/>
       <dgm:spPr/>
+      <dgm:t>
+        <a:bodyPr/>
+        <a:lstStyle/>
+        <a:p>
+          <a:pPr latinLnBrk="1"/>
+          <a:endParaRPr lang="ko-KR" altLang="en-US"/>
+        </a:p>
+      </dgm:t>
     </dgm:pt>
     <dgm:pt modelId="{D9CF1AC7-E899-4162-A0DA-437200237F4C}" type="pres">
       <dgm:prSet presAssocID="{97978136-BC51-4981-90BF-11C4F21D8B06}" presName="hierChild4" presStyleCnt="0"/>
@@ -1582,6 +1702,14 @@
     <dgm:pt modelId="{A40CC5F2-3B0D-41CD-9846-8DA54221BCFF}" type="pres">
       <dgm:prSet presAssocID="{11257359-CDF4-446B-B922-70AFAC772C18}" presName="Name37" presStyleLbl="parChTrans1D2" presStyleIdx="5" presStyleCnt="6"/>
       <dgm:spPr/>
+      <dgm:t>
+        <a:bodyPr/>
+        <a:lstStyle/>
+        <a:p>
+          <a:pPr latinLnBrk="1"/>
+          <a:endParaRPr lang="ko-KR" altLang="en-US"/>
+        </a:p>
+      </dgm:t>
     </dgm:pt>
     <dgm:pt modelId="{76B92CAD-1279-4C34-AF7D-66123724AB0D}" type="pres">
       <dgm:prSet presAssocID="{7D7C0639-8964-421F-A0A2-567F323F7297}" presName="hierRoot2" presStyleCnt="0">
@@ -1602,10 +1730,26 @@
         </dgm:presLayoutVars>
       </dgm:prSet>
       <dgm:spPr/>
+      <dgm:t>
+        <a:bodyPr/>
+        <a:lstStyle/>
+        <a:p>
+          <a:pPr latinLnBrk="1"/>
+          <a:endParaRPr lang="ko-KR" altLang="en-US"/>
+        </a:p>
+      </dgm:t>
     </dgm:pt>
     <dgm:pt modelId="{4EBE6F6C-43A9-4595-A0DC-CB315D99D8B7}" type="pres">
       <dgm:prSet presAssocID="{7D7C0639-8964-421F-A0A2-567F323F7297}" presName="rootConnector" presStyleLbl="node2" presStyleIdx="5" presStyleCnt="6"/>
       <dgm:spPr/>
+      <dgm:t>
+        <a:bodyPr/>
+        <a:lstStyle/>
+        <a:p>
+          <a:pPr latinLnBrk="1"/>
+          <a:endParaRPr lang="ko-KR" altLang="en-US"/>
+        </a:p>
+      </dgm:t>
     </dgm:pt>
     <dgm:pt modelId="{5C6F29DE-9060-4CB9-88A9-6CA8295AA8FD}" type="pres">
       <dgm:prSet presAssocID="{7D7C0639-8964-421F-A0A2-567F323F7297}" presName="hierChild4" presStyleCnt="0"/>
@@ -4938,7 +5082,7 @@
           <a:p>
             <a:fld id="{BCFED37B-5E28-4644-A468-43AB991E6436}" type="datetimeFigureOut">
               <a:rPr lang="en-US" smtClean="0"/>
-              <a:t>6/25/2017</a:t>
+              <a:t>6/26/2017</a:t>
             </a:fld>
             <a:endParaRPr lang="en-US"/>
           </a:p>
@@ -5521,7 +5665,7 @@
           <a:p>
             <a:fld id="{D5A56EB4-82C6-44A6-95F9-E1932E3C740E}" type="datetimeFigureOut">
               <a:rPr lang="ko-KR" altLang="en-US" smtClean="0"/>
-              <a:t>2017-06-25</a:t>
+              <a:t>2017-06-26</a:t>
             </a:fld>
             <a:endParaRPr lang="ko-KR" altLang="en-US"/>
           </a:p>
@@ -5702,7 +5846,7 @@
           <a:p>
             <a:fld id="{D5A56EB4-82C6-44A6-95F9-E1932E3C740E}" type="datetimeFigureOut">
               <a:rPr lang="ko-KR" altLang="en-US" smtClean="0"/>
-              <a:t>2017-06-25</a:t>
+              <a:t>2017-06-26</a:t>
             </a:fld>
             <a:endParaRPr lang="ko-KR" altLang="en-US"/>
           </a:p>
@@ -5882,7 +6026,7 @@
           <a:p>
             <a:fld id="{D5A56EB4-82C6-44A6-95F9-E1932E3C740E}" type="datetimeFigureOut">
               <a:rPr lang="ko-KR" altLang="en-US" smtClean="0"/>
-              <a:t>2017-06-25</a:t>
+              <a:t>2017-06-26</a:t>
             </a:fld>
             <a:endParaRPr lang="ko-KR" altLang="en-US"/>
           </a:p>
@@ -6052,7 +6196,7 @@
           <a:p>
             <a:fld id="{D5A56EB4-82C6-44A6-95F9-E1932E3C740E}" type="datetimeFigureOut">
               <a:rPr lang="ko-KR" altLang="en-US" smtClean="0"/>
-              <a:t>2017-06-25</a:t>
+              <a:t>2017-06-26</a:t>
             </a:fld>
             <a:endParaRPr lang="ko-KR" altLang="en-US"/>
           </a:p>
@@ -6303,7 +6447,7 @@
           <a:p>
             <a:fld id="{D5A56EB4-82C6-44A6-95F9-E1932E3C740E}" type="datetimeFigureOut">
               <a:rPr lang="ko-KR" altLang="en-US" smtClean="0"/>
-              <a:t>2017-06-25</a:t>
+              <a:t>2017-06-26</a:t>
             </a:fld>
             <a:endParaRPr lang="ko-KR" altLang="en-US"/>
           </a:p>
@@ -6535,7 +6679,7 @@
           <a:p>
             <a:fld id="{D5A56EB4-82C6-44A6-95F9-E1932E3C740E}" type="datetimeFigureOut">
               <a:rPr lang="ko-KR" altLang="en-US" smtClean="0"/>
-              <a:t>2017-06-25</a:t>
+              <a:t>2017-06-26</a:t>
             </a:fld>
             <a:endParaRPr lang="ko-KR" altLang="en-US"/>
           </a:p>
@@ -6902,7 +7046,7 @@
           <a:p>
             <a:fld id="{D5A56EB4-82C6-44A6-95F9-E1932E3C740E}" type="datetimeFigureOut">
               <a:rPr lang="ko-KR" altLang="en-US" smtClean="0"/>
-              <a:t>2017-06-25</a:t>
+              <a:t>2017-06-26</a:t>
             </a:fld>
             <a:endParaRPr lang="ko-KR" altLang="en-US"/>
           </a:p>
@@ -7020,7 +7164,7 @@
           <a:p>
             <a:fld id="{D5A56EB4-82C6-44A6-95F9-E1932E3C740E}" type="datetimeFigureOut">
               <a:rPr lang="ko-KR" altLang="en-US" smtClean="0"/>
-              <a:t>2017-06-25</a:t>
+              <a:t>2017-06-26</a:t>
             </a:fld>
             <a:endParaRPr lang="ko-KR" altLang="en-US"/>
           </a:p>
@@ -7115,7 +7259,7 @@
           <a:p>
             <a:fld id="{D5A56EB4-82C6-44A6-95F9-E1932E3C740E}" type="datetimeFigureOut">
               <a:rPr lang="ko-KR" altLang="en-US" smtClean="0"/>
-              <a:t>2017-06-25</a:t>
+              <a:t>2017-06-26</a:t>
             </a:fld>
             <a:endParaRPr lang="ko-KR" altLang="en-US"/>
           </a:p>
@@ -7392,7 +7536,7 @@
           <a:p>
             <a:fld id="{D5A56EB4-82C6-44A6-95F9-E1932E3C740E}" type="datetimeFigureOut">
               <a:rPr lang="ko-KR" altLang="en-US" smtClean="0"/>
-              <a:t>2017-06-25</a:t>
+              <a:t>2017-06-26</a:t>
             </a:fld>
             <a:endParaRPr lang="ko-KR" altLang="en-US"/>
           </a:p>
@@ -7649,7 +7793,7 @@
           <a:p>
             <a:fld id="{D5A56EB4-82C6-44A6-95F9-E1932E3C740E}" type="datetimeFigureOut">
               <a:rPr lang="ko-KR" altLang="en-US" smtClean="0"/>
-              <a:t>2017-06-25</a:t>
+              <a:t>2017-06-26</a:t>
             </a:fld>
             <a:endParaRPr lang="ko-KR" altLang="en-US"/>
           </a:p>
@@ -7864,7 +8008,7 @@
             <a:fld id="{D5A56EB4-82C6-44A6-95F9-E1932E3C740E}" type="datetimeFigureOut">
               <a:rPr lang="ko-KR" altLang="en-US" smtClean="0"/>
               <a:pPr/>
-              <a:t>2017-06-25</a:t>
+              <a:t>2017-06-26</a:t>
             </a:fld>
             <a:endParaRPr lang="ko-KR" altLang="en-US"/>
           </a:p>
@@ -8493,6 +8637,9 @@
   <p:clrMapOvr>
     <a:masterClrMapping/>
   </p:clrMapOvr>
+  <p:transition spd="slow">
+    <p:push dir="r"/>
+  </p:transition>
   <p:timing>
     <p:tnLst>
       <p:par>
@@ -8604,6 +8751,9 @@
   <p:clrMapOvr>
     <a:masterClrMapping/>
   </p:clrMapOvr>
+  <p:transition spd="slow">
+    <p:push dir="d"/>
+  </p:transition>
   <p:timing>
     <p:tnLst>
       <p:par>
@@ -8713,6 +8863,9 @@
   <p:clrMapOvr>
     <a:masterClrMapping/>
   </p:clrMapOvr>
+  <p:transition spd="slow">
+    <p:push dir="r"/>
+  </p:transition>
   <p:timing>
     <p:tnLst>
       <p:par>
@@ -10378,6 +10531,9 @@
   <p:clrMapOvr>
     <a:masterClrMapping/>
   </p:clrMapOvr>
+  <p:transition spd="slow">
+    <p:push dir="u"/>
+  </p:transition>
   <p:timing>
     <p:tnLst>
       <p:par>
@@ -10614,6 +10770,9 @@
   <p:clrMapOvr>
     <a:masterClrMapping/>
   </p:clrMapOvr>
+  <p:transition spd="slow">
+    <p:push dir="u"/>
+  </p:transition>
   <p:timing>
     <p:tnLst>
       <p:par>
@@ -10738,6 +10897,9 @@
   <p:clrMapOvr>
     <a:masterClrMapping/>
   </p:clrMapOvr>
+  <p:transition spd="slow">
+    <p:push/>
+  </p:transition>
   <p:timing>
     <p:tnLst>
       <p:par>
@@ -10824,6 +10986,9 @@
   <p:clrMapOvr>
     <a:masterClrMapping/>
   </p:clrMapOvr>
+  <p:transition spd="slow">
+    <p:push dir="u"/>
+  </p:transition>
   <p:timing>
     <p:tnLst>
       <p:par>

</xml_diff>